<commit_message>
Added updated manual and meshio subroutines
</commit_message>
<xml_diff>
--- a/MODELS/[01]TEMPLATE/template.pptx
+++ b/MODELS/[01]TEMPLATE/template.pptx
@@ -5,11 +5,12 @@
     <p:sldMasterId id="2147483648" r:id="rId1"/>
   </p:sldMasterIdLst>
   <p:notesMasterIdLst>
-    <p:notesMasterId r:id="rId4"/>
+    <p:notesMasterId r:id="rId5"/>
   </p:notesMasterIdLst>
   <p:sldIdLst>
     <p:sldId id="256" r:id="rId2"/>
     <p:sldId id="257" r:id="rId3"/>
+    <p:sldId id="258" r:id="rId4"/>
   </p:sldIdLst>
   <p:sldSz cx="12192000" cy="6858000"/>
   <p:notesSz cx="6858000" cy="9144000"/>
@@ -110,7 +111,18 @@
   </p:defaultTextStyle>
   <p:extLst>
     <p:ext uri="{EFAFB233-063F-42B5-8137-9DF3F51BA10A}">
-      <p15:sldGuideLst xmlns:p15="http://schemas.microsoft.com/office/powerpoint/2012/main"/>
+      <p15:sldGuideLst xmlns:p15="http://schemas.microsoft.com/office/powerpoint/2012/main">
+        <p15:guide id="1" orient="horz" pos="2160">
+          <p15:clr>
+            <a:srgbClr val="A4A3A4"/>
+          </p15:clr>
+        </p15:guide>
+        <p15:guide id="2" pos="3840">
+          <p15:clr>
+            <a:srgbClr val="A4A3A4"/>
+          </p15:clr>
+        </p15:guide>
+      </p15:sldGuideLst>
     </p:ext>
   </p:extLst>
 </p:presentation>
@@ -198,7 +210,7 @@
           <a:p>
             <a:fld id="{F8B6383B-61A9-2D45-8D32-4F18EA1166FF}" type="datetimeFigureOut">
               <a:rPr lang="en-US" smtClean="0"/>
-              <a:t>8/23/17</a:t>
+              <a:t>9/25/17</a:t>
             </a:fld>
             <a:endParaRPr lang="en-US"/>
           </a:p>
@@ -765,7 +777,7 @@
           <a:p>
             <a:fld id="{8B7F60DD-BA8F-734D-B7DF-56302F55B612}" type="datetimeFigureOut">
               <a:rPr lang="en-US" smtClean="0"/>
-              <a:t>8/23/17</a:t>
+              <a:t>9/25/17</a:t>
             </a:fld>
             <a:endParaRPr lang="en-US"/>
           </a:p>
@@ -935,7 +947,7 @@
           <a:p>
             <a:fld id="{8B7F60DD-BA8F-734D-B7DF-56302F55B612}" type="datetimeFigureOut">
               <a:rPr lang="en-US" smtClean="0"/>
-              <a:t>8/23/17</a:t>
+              <a:t>9/25/17</a:t>
             </a:fld>
             <a:endParaRPr lang="en-US"/>
           </a:p>
@@ -1115,7 +1127,7 @@
           <a:p>
             <a:fld id="{8B7F60DD-BA8F-734D-B7DF-56302F55B612}" type="datetimeFigureOut">
               <a:rPr lang="en-US" smtClean="0"/>
-              <a:t>8/23/17</a:t>
+              <a:t>9/25/17</a:t>
             </a:fld>
             <a:endParaRPr lang="en-US"/>
           </a:p>
@@ -1285,7 +1297,7 @@
           <a:p>
             <a:fld id="{8B7F60DD-BA8F-734D-B7DF-56302F55B612}" type="datetimeFigureOut">
               <a:rPr lang="en-US" smtClean="0"/>
-              <a:t>8/23/17</a:t>
+              <a:t>9/25/17</a:t>
             </a:fld>
             <a:endParaRPr lang="en-US"/>
           </a:p>
@@ -1531,7 +1543,7 @@
           <a:p>
             <a:fld id="{8B7F60DD-BA8F-734D-B7DF-56302F55B612}" type="datetimeFigureOut">
               <a:rPr lang="en-US" smtClean="0"/>
-              <a:t>8/23/17</a:t>
+              <a:t>9/25/17</a:t>
             </a:fld>
             <a:endParaRPr lang="en-US"/>
           </a:p>
@@ -1763,7 +1775,7 @@
           <a:p>
             <a:fld id="{8B7F60DD-BA8F-734D-B7DF-56302F55B612}" type="datetimeFigureOut">
               <a:rPr lang="en-US" smtClean="0"/>
-              <a:t>8/23/17</a:t>
+              <a:t>9/25/17</a:t>
             </a:fld>
             <a:endParaRPr lang="en-US"/>
           </a:p>
@@ -2130,7 +2142,7 @@
           <a:p>
             <a:fld id="{8B7F60DD-BA8F-734D-B7DF-56302F55B612}" type="datetimeFigureOut">
               <a:rPr lang="en-US" smtClean="0"/>
-              <a:t>8/23/17</a:t>
+              <a:t>9/25/17</a:t>
             </a:fld>
             <a:endParaRPr lang="en-US"/>
           </a:p>
@@ -2248,7 +2260,7 @@
           <a:p>
             <a:fld id="{8B7F60DD-BA8F-734D-B7DF-56302F55B612}" type="datetimeFigureOut">
               <a:rPr lang="en-US" smtClean="0"/>
-              <a:t>8/23/17</a:t>
+              <a:t>9/25/17</a:t>
             </a:fld>
             <a:endParaRPr lang="en-US"/>
           </a:p>
@@ -2343,7 +2355,7 @@
           <a:p>
             <a:fld id="{8B7F60DD-BA8F-734D-B7DF-56302F55B612}" type="datetimeFigureOut">
               <a:rPr lang="en-US" smtClean="0"/>
-              <a:t>8/23/17</a:t>
+              <a:t>9/25/17</a:t>
             </a:fld>
             <a:endParaRPr lang="en-US"/>
           </a:p>
@@ -2620,7 +2632,7 @@
           <a:p>
             <a:fld id="{8B7F60DD-BA8F-734D-B7DF-56302F55B612}" type="datetimeFigureOut">
               <a:rPr lang="en-US" smtClean="0"/>
-              <a:t>8/23/17</a:t>
+              <a:t>9/25/17</a:t>
             </a:fld>
             <a:endParaRPr lang="en-US"/>
           </a:p>
@@ -2873,7 +2885,7 @@
           <a:p>
             <a:fld id="{8B7F60DD-BA8F-734D-B7DF-56302F55B612}" type="datetimeFigureOut">
               <a:rPr lang="en-US" smtClean="0"/>
-              <a:t>8/23/17</a:t>
+              <a:t>9/25/17</a:t>
             </a:fld>
             <a:endParaRPr lang="en-US"/>
           </a:p>
@@ -3086,7 +3098,7 @@
           <a:p>
             <a:fld id="{8B7F60DD-BA8F-734D-B7DF-56302F55B612}" type="datetimeFigureOut">
               <a:rPr lang="en-US" smtClean="0"/>
-              <a:t>8/23/17</a:t>
+              <a:t>9/25/17</a:t>
             </a:fld>
             <a:endParaRPr lang="en-US"/>
           </a:p>
@@ -11080,6 +11092,60 @@
 </p:sld>
 </file>
 
+<file path=ppt/slides/slide3.xml><?xml version="1.0" encoding="utf-8"?>
+<p:sld xmlns:a="http://schemas.openxmlformats.org/drawingml/2006/main" xmlns:r="http://schemas.openxmlformats.org/officeDocument/2006/relationships" xmlns:p="http://schemas.openxmlformats.org/presentationml/2006/main">
+  <p:cSld>
+    <p:spTree>
+      <p:nvGrpSpPr>
+        <p:cNvPr id="1" name=""/>
+        <p:cNvGrpSpPr/>
+        <p:nvPr/>
+      </p:nvGrpSpPr>
+      <p:grpSpPr>
+        <a:xfrm>
+          <a:off x="0" y="0"/>
+          <a:ext cx="0" cy="0"/>
+          <a:chOff x="0" y="0"/>
+          <a:chExt cx="0" cy="0"/>
+        </a:xfrm>
+      </p:grpSpPr>
+      <p:pic>
+        <p:nvPicPr>
+          <p:cNvPr id="2" name="Picture 1"/>
+          <p:cNvPicPr>
+            <a:picLocks noChangeAspect="1"/>
+          </p:cNvPicPr>
+          <p:nvPr/>
+        </p:nvPicPr>
+        <p:blipFill>
+          <a:blip r:embed="rId2"/>
+          <a:stretch>
+            <a:fillRect/>
+          </a:stretch>
+        </p:blipFill>
+        <p:spPr>
+          <a:xfrm>
+            <a:off x="463550" y="444500"/>
+            <a:ext cx="11264900" cy="5969000"/>
+          </a:xfrm>
+          <a:prstGeom prst="rect">
+            <a:avLst/>
+          </a:prstGeom>
+        </p:spPr>
+      </p:pic>
+    </p:spTree>
+    <p:extLst>
+      <p:ext uri="{BB962C8B-B14F-4D97-AF65-F5344CB8AC3E}">
+        <p14:creationId xmlns:p14="http://schemas.microsoft.com/office/powerpoint/2010/main" val="694632785"/>
+      </p:ext>
+    </p:extLst>
+  </p:cSld>
+  <p:clrMapOvr>
+    <a:masterClrMapping/>
+  </p:clrMapOvr>
+</p:sld>
+</file>
+
 <file path=ppt/theme/theme1.xml><?xml version="1.0" encoding="utf-8"?>
 <a:theme xmlns:a="http://schemas.openxmlformats.org/drawingml/2006/main" name="Office Theme">
   <a:themeElements>
@@ -11123,7 +11189,7 @@
     </a:clrScheme>
     <a:fontScheme name="Office">
       <a:majorFont>
-        <a:latin typeface="Calibri Light" panose="020F0302020204030204"/>
+        <a:latin typeface="Calibri Light"/>
         <a:ea typeface=""/>
         <a:cs typeface=""/>
         <a:font script="Jpan" typeface="Yu Gothic Light"/>
@@ -11158,7 +11224,7 @@
         <a:font script="Geor" typeface="Sylfaen"/>
       </a:majorFont>
       <a:minorFont>
-        <a:latin typeface="Calibri" panose="020F0502020204030204"/>
+        <a:latin typeface="Calibri"/>
         <a:ea typeface=""/>
         <a:cs typeface=""/>
         <a:font script="Jpan" typeface="Yu Gothic"/>
@@ -11384,7 +11450,7 @@
     </a:clrScheme>
     <a:fontScheme name="Office">
       <a:majorFont>
-        <a:latin typeface="Calibri Light" panose="020F0302020204030204"/>
+        <a:latin typeface="Calibri Light"/>
         <a:ea typeface=""/>
         <a:cs typeface=""/>
         <a:font script="Jpan" typeface="Yu Gothic Light"/>
@@ -11419,7 +11485,7 @@
         <a:font script="Geor" typeface="Sylfaen"/>
       </a:majorFont>
       <a:minorFont>
-        <a:latin typeface="Calibri" panose="020F0502020204030204"/>
+        <a:latin typeface="Calibri"/>
         <a:ea typeface=""/>
         <a:cs typeface=""/>
         <a:font script="Jpan" typeface="Yu Gothic"/>

</xml_diff>